<commit_message>
correccion del story 2
</commit_message>
<xml_diff>
--- a/Sprint 3 - Story2.pptx
+++ b/Sprint 3 - Story2.pptx
@@ -11,6 +11,8 @@
     <p:sldId id="259" r:id="rId5"/>
     <p:sldId id="260" r:id="rId6"/>
     <p:sldId id="261" r:id="rId7"/>
+    <p:sldId id="262" r:id="rId8"/>
+    <p:sldId id="263" r:id="rId9"/>
   </p:sldIdLst>
   <p:sldSz cx="12192000" cy="6858000"/>
   <p:notesSz cx="6858000" cy="9144000"/>
@@ -109,6 +111,11 @@
       </a:defRPr>
     </a:lvl9pPr>
   </p:defaultTextStyle>
+  <p:extLst>
+    <p:ext uri="{EFAFB233-063F-42B5-8137-9DF3F51BA10A}">
+      <p15:sldGuideLst xmlns:p15="http://schemas.microsoft.com/office/powerpoint/2012/main"/>
+    </p:ext>
+  </p:extLst>
 </p:presentation>
 </file>
 
@@ -271,7 +278,7 @@
           <a:p>
             <a:fld id="{64F0E216-BA48-4F04-AC4F-645AA0DD6AC6}" type="datetimeFigureOut">
               <a:rPr lang="en-US" smtClean="0"/>
-              <a:t>12/22/2021</a:t>
+              <a:t>1/12/2022</a:t>
             </a:fld>
             <a:endParaRPr lang="en-US" dirty="0"/>
           </a:p>
@@ -1319,7 +1326,7 @@
           <a:p>
             <a:fld id="{64F0E216-BA48-4F04-AC4F-645AA0DD6AC6}" type="datetimeFigureOut">
               <a:rPr lang="en-US" smtClean="0"/>
-              <a:t>12/22/2021</a:t>
+              <a:t>1/12/2022</a:t>
             </a:fld>
             <a:endParaRPr lang="en-US"/>
           </a:p>
@@ -1555,7 +1562,7 @@
           <a:p>
             <a:fld id="{64F0E216-BA48-4F04-AC4F-645AA0DD6AC6}" type="datetimeFigureOut">
               <a:rPr lang="en-US" smtClean="0"/>
-              <a:t>12/22/2021</a:t>
+              <a:t>1/12/2022</a:t>
             </a:fld>
             <a:endParaRPr lang="en-US"/>
           </a:p>
@@ -1778,7 +1785,7 @@
           <a:p>
             <a:fld id="{64F0E216-BA48-4F04-AC4F-645AA0DD6AC6}" type="datetimeFigureOut">
               <a:rPr lang="en-US" smtClean="0"/>
-              <a:t>12/22/2021</a:t>
+              <a:t>1/12/2022</a:t>
             </a:fld>
             <a:endParaRPr lang="en-US"/>
           </a:p>
@@ -2080,7 +2087,7 @@
           <a:p>
             <a:fld id="{64F0E216-BA48-4F04-AC4F-645AA0DD6AC6}" type="datetimeFigureOut">
               <a:rPr lang="en-US" smtClean="0"/>
-              <a:t>12/22/2021</a:t>
+              <a:t>1/12/2022</a:t>
             </a:fld>
             <a:endParaRPr lang="en-US"/>
           </a:p>
@@ -3544,7 +3551,7 @@
           <a:p>
             <a:fld id="{64F0E216-BA48-4F04-AC4F-645AA0DD6AC6}" type="datetimeFigureOut">
               <a:rPr lang="en-US" smtClean="0"/>
-              <a:t>12/22/2021</a:t>
+              <a:t>1/12/2022</a:t>
             </a:fld>
             <a:endParaRPr lang="en-US"/>
           </a:p>
@@ -4011,7 +4018,7 @@
           <a:p>
             <a:fld id="{64F0E216-BA48-4F04-AC4F-645AA0DD6AC6}" type="datetimeFigureOut">
               <a:rPr lang="en-US" smtClean="0"/>
-              <a:t>12/22/2021</a:t>
+              <a:t>1/12/2022</a:t>
             </a:fld>
             <a:endParaRPr lang="en-US"/>
           </a:p>
@@ -4186,7 +4193,7 @@
           <a:p>
             <a:fld id="{64F0E216-BA48-4F04-AC4F-645AA0DD6AC6}" type="datetimeFigureOut">
               <a:rPr lang="en-US" smtClean="0"/>
-              <a:t>12/22/2021</a:t>
+              <a:t>1/12/2022</a:t>
             </a:fld>
             <a:endParaRPr lang="en-US"/>
           </a:p>
@@ -4323,7 +4330,7 @@
           <a:p>
             <a:fld id="{64F0E216-BA48-4F04-AC4F-645AA0DD6AC6}" type="datetimeFigureOut">
               <a:rPr lang="en-US" smtClean="0"/>
-              <a:t>12/22/2021</a:t>
+              <a:t>1/12/2022</a:t>
             </a:fld>
             <a:endParaRPr lang="en-US"/>
           </a:p>
@@ -4673,7 +4680,7 @@
           <a:p>
             <a:fld id="{64F0E216-BA48-4F04-AC4F-645AA0DD6AC6}" type="datetimeFigureOut">
               <a:rPr lang="en-US" smtClean="0"/>
-              <a:t>12/22/2021</a:t>
+              <a:t>1/12/2022</a:t>
             </a:fld>
             <a:endParaRPr lang="en-US"/>
           </a:p>
@@ -4994,7 +5001,7 @@
           <a:p>
             <a:fld id="{64F0E216-BA48-4F04-AC4F-645AA0DD6AC6}" type="datetimeFigureOut">
               <a:rPr lang="en-US" smtClean="0"/>
-              <a:t>12/22/2021</a:t>
+              <a:t>1/12/2022</a:t>
             </a:fld>
             <a:endParaRPr lang="en-US"/>
           </a:p>
@@ -5256,7 +5263,7 @@
             <a:fld id="{64F0E216-BA48-4F04-AC4F-645AA0DD6AC6}" type="datetimeFigureOut">
               <a:rPr lang="en-US" smtClean="0"/>
               <a:pPr/>
-              <a:t>12/22/2021</a:t>
+              <a:t>1/12/2022</a:t>
             </a:fld>
             <a:endParaRPr lang="en-US" dirty="0"/>
           </a:p>
@@ -6635,6 +6642,354 @@
 </p:sld>
 </file>
 
+<file path=ppt/slides/slide7.xml><?xml version="1.0" encoding="utf-8"?>
+<p:sld xmlns:a="http://schemas.openxmlformats.org/drawingml/2006/main" xmlns:r="http://schemas.openxmlformats.org/officeDocument/2006/relationships" xmlns:p="http://schemas.openxmlformats.org/presentationml/2006/main">
+  <p:cSld>
+    <p:spTree>
+      <p:nvGrpSpPr>
+        <p:cNvPr id="1" name=""/>
+        <p:cNvGrpSpPr/>
+        <p:nvPr/>
+      </p:nvGrpSpPr>
+      <p:grpSpPr>
+        <a:xfrm>
+          <a:off x="0" y="0"/>
+          <a:ext cx="0" cy="0"/>
+          <a:chOff x="0" y="0"/>
+          <a:chExt cx="0" cy="0"/>
+        </a:xfrm>
+      </p:grpSpPr>
+      <p:sp>
+        <p:nvSpPr>
+          <p:cNvPr id="2" name="Título 1">
+            <a:extLst>
+              <a:ext uri="{FF2B5EF4-FFF2-40B4-BE49-F238E27FC236}">
+                <a16:creationId xmlns:a16="http://schemas.microsoft.com/office/drawing/2014/main" id="{01986175-4A6F-49F1-BA88-8CFF2CF14911}"/>
+              </a:ext>
+            </a:extLst>
+          </p:cNvPr>
+          <p:cNvSpPr>
+            <a:spLocks noGrp="1"/>
+          </p:cNvSpPr>
+          <p:nvPr>
+            <p:ph type="ctrTitle"/>
+          </p:nvPr>
+        </p:nvSpPr>
+        <p:spPr>
+          <a:xfrm>
+            <a:off x="2197100" y="1079500"/>
+            <a:ext cx="8294437" cy="2138400"/>
+          </a:xfrm>
+        </p:spPr>
+        <p:txBody>
+          <a:bodyPr>
+            <a:normAutofit fontScale="90000"/>
+          </a:bodyPr>
+          <a:lstStyle/>
+          <a:p>
+            <a:r>
+              <a:rPr lang="es-ES" sz="4800" dirty="0"/>
+              <a:t>COSTE De los errores en fase de detección</a:t>
+            </a:r>
+          </a:p>
+        </p:txBody>
+      </p:sp>
+      <p:sp>
+        <p:nvSpPr>
+          <p:cNvPr id="3" name="CuadroTexto 2">
+            <a:extLst>
+              <a:ext uri="{FF2B5EF4-FFF2-40B4-BE49-F238E27FC236}">
+                <a16:creationId xmlns:a16="http://schemas.microsoft.com/office/drawing/2014/main" id="{BB63A759-02DB-46CE-8DFE-26AF1B8AEC3F}"/>
+              </a:ext>
+            </a:extLst>
+          </p:cNvPr>
+          <p:cNvSpPr txBox="1"/>
+          <p:nvPr/>
+        </p:nvSpPr>
+        <p:spPr>
+          <a:xfrm>
+            <a:off x="2785145" y="4815281"/>
+            <a:ext cx="6162302" cy="1754326"/>
+          </a:xfrm>
+          <a:prstGeom prst="rect">
+            <a:avLst/>
+          </a:prstGeom>
+          <a:noFill/>
+        </p:spPr>
+        <p:txBody>
+          <a:bodyPr wrap="square" rtlCol="0">
+            <a:spAutoFit/>
+          </a:bodyPr>
+          <a:lstStyle/>
+          <a:p>
+            <a:r>
+              <a:rPr lang="es-ES" dirty="0"/>
+              <a:t>El coste de </a:t>
+            </a:r>
+            <a:r>
+              <a:rPr lang="es-ES" dirty="0">
+                <a:solidFill>
+                  <a:schemeClr val="tx1">
+                    <a:lumMod val="95000"/>
+                  </a:schemeClr>
+                </a:solidFill>
+              </a:rPr>
+              <a:t>los </a:t>
+            </a:r>
+            <a:r>
+              <a:rPr lang="es-ES" b="0" i="0" dirty="0">
+                <a:solidFill>
+                  <a:schemeClr val="tx1">
+                    <a:lumMod val="95000"/>
+                  </a:schemeClr>
+                </a:solidFill>
+                <a:effectLst/>
+                <a:latin typeface="Lato" panose="020B0604020202020204" pitchFamily="34" charset="0"/>
+              </a:rPr>
+              <a:t>errores depende sobre todo del momento en el que se detectan. Un error detectado en el momento en el que ocurre, tiene un coste muy bajo. El coste crece cuando pasa más tiempo entre que se produce y se detecta. El peor escenario posible es un error introducido al comenzar el proyecto y detectado una vez ya entregado.</a:t>
+            </a:r>
+            <a:endParaRPr lang="es-ES" dirty="0">
+              <a:solidFill>
+                <a:schemeClr val="tx1">
+                  <a:lumMod val="95000"/>
+                </a:schemeClr>
+              </a:solidFill>
+            </a:endParaRPr>
+          </a:p>
+        </p:txBody>
+      </p:sp>
+    </p:spTree>
+    <p:extLst>
+      <p:ext uri="{BB962C8B-B14F-4D97-AF65-F5344CB8AC3E}">
+        <p14:creationId xmlns:p14="http://schemas.microsoft.com/office/powerpoint/2010/main" val="263065270"/>
+      </p:ext>
+    </p:extLst>
+  </p:cSld>
+  <p:clrMapOvr>
+    <a:masterClrMapping/>
+  </p:clrMapOvr>
+</p:sld>
+</file>
+
+<file path=ppt/slides/slide8.xml><?xml version="1.0" encoding="utf-8"?>
+<p:sld xmlns:a="http://schemas.openxmlformats.org/drawingml/2006/main" xmlns:r="http://schemas.openxmlformats.org/officeDocument/2006/relationships" xmlns:p="http://schemas.openxmlformats.org/presentationml/2006/main">
+  <p:cSld>
+    <p:spTree>
+      <p:nvGrpSpPr>
+        <p:cNvPr id="1" name=""/>
+        <p:cNvGrpSpPr/>
+        <p:nvPr/>
+      </p:nvGrpSpPr>
+      <p:grpSpPr>
+        <a:xfrm>
+          <a:off x="0" y="0"/>
+          <a:ext cx="0" cy="0"/>
+          <a:chOff x="0" y="0"/>
+          <a:chExt cx="0" cy="0"/>
+        </a:xfrm>
+      </p:grpSpPr>
+      <p:sp>
+        <p:nvSpPr>
+          <p:cNvPr id="2" name="Título 1">
+            <a:extLst>
+              <a:ext uri="{FF2B5EF4-FFF2-40B4-BE49-F238E27FC236}">
+                <a16:creationId xmlns:a16="http://schemas.microsoft.com/office/drawing/2014/main" id="{01986175-4A6F-49F1-BA88-8CFF2CF14911}"/>
+              </a:ext>
+            </a:extLst>
+          </p:cNvPr>
+          <p:cNvSpPr>
+            <a:spLocks noGrp="1"/>
+          </p:cNvSpPr>
+          <p:nvPr>
+            <p:ph type="ctrTitle"/>
+          </p:nvPr>
+        </p:nvSpPr>
+        <p:spPr>
+          <a:xfrm>
+            <a:off x="2071266" y="876434"/>
+            <a:ext cx="7609630" cy="796953"/>
+          </a:xfrm>
+        </p:spPr>
+        <p:txBody>
+          <a:bodyPr>
+            <a:normAutofit/>
+          </a:bodyPr>
+          <a:lstStyle/>
+          <a:p>
+            <a:r>
+              <a:rPr lang="es-ES" sz="1800" b="0" i="0" dirty="0">
+                <a:solidFill>
+                  <a:schemeClr val="tx1">
+                    <a:lumMod val="95000"/>
+                  </a:schemeClr>
+                </a:solidFill>
+                <a:effectLst/>
+                <a:latin typeface="Lato" panose="020F0502020204030203" pitchFamily="34" charset="0"/>
+              </a:rPr>
+              <a:t>Hay dos caminos para reducir el coste de estos errores:</a:t>
+            </a:r>
+            <a:endParaRPr lang="es-ES" sz="1800" dirty="0">
+              <a:solidFill>
+                <a:schemeClr val="tx1">
+                  <a:lumMod val="95000"/>
+                </a:schemeClr>
+              </a:solidFill>
+            </a:endParaRPr>
+          </a:p>
+        </p:txBody>
+      </p:sp>
+      <p:sp>
+        <p:nvSpPr>
+          <p:cNvPr id="4" name="CuadroTexto 3">
+            <a:extLst>
+              <a:ext uri="{FF2B5EF4-FFF2-40B4-BE49-F238E27FC236}">
+                <a16:creationId xmlns:a16="http://schemas.microsoft.com/office/drawing/2014/main" id="{1FED4C9A-67CD-4F5C-8F0E-FC715BA26333}"/>
+              </a:ext>
+            </a:extLst>
+          </p:cNvPr>
+          <p:cNvSpPr txBox="1"/>
+          <p:nvPr/>
+        </p:nvSpPr>
+        <p:spPr>
+          <a:xfrm>
+            <a:off x="2812972" y="2072708"/>
+            <a:ext cx="7866214" cy="1200329"/>
+          </a:xfrm>
+          <a:prstGeom prst="rect">
+            <a:avLst/>
+          </a:prstGeom>
+          <a:noFill/>
+        </p:spPr>
+        <p:txBody>
+          <a:bodyPr wrap="square" rtlCol="0">
+            <a:spAutoFit/>
+          </a:bodyPr>
+          <a:lstStyle/>
+          <a:p>
+            <a:r>
+              <a:rPr lang="es-ES" b="0" i="0" dirty="0">
+                <a:solidFill>
+                  <a:schemeClr val="tx1">
+                    <a:lumMod val="95000"/>
+                  </a:schemeClr>
+                </a:solidFill>
+                <a:effectLst/>
+                <a:latin typeface="Lato" panose="020F0502020204030203" pitchFamily="34" charset="0"/>
+              </a:rPr>
+              <a:t>- Dedicar más tiempo a la toma de requisitos. Esto es importante para reducir los fallos </a:t>
+            </a:r>
+            <a:r>
+              <a:rPr lang="es-ES" dirty="0">
+                <a:solidFill>
+                  <a:schemeClr val="tx1">
+                    <a:lumMod val="95000"/>
+                  </a:schemeClr>
+                </a:solidFill>
+                <a:latin typeface="Lato" panose="020F0502020204030203" pitchFamily="34" charset="0"/>
+              </a:rPr>
+              <a:t>en esta etapa ya que estos</a:t>
+            </a:r>
+            <a:r>
+              <a:rPr lang="es-ES" b="0" i="0" dirty="0">
+                <a:solidFill>
+                  <a:schemeClr val="tx1">
+                    <a:lumMod val="95000"/>
+                  </a:schemeClr>
+                </a:solidFill>
+                <a:effectLst/>
+                <a:latin typeface="Lato" panose="020F0502020204030203" pitchFamily="34" charset="0"/>
+              </a:rPr>
+              <a:t> suponen un coste altísimo debido a que se suelen detectar al final del proyecto.</a:t>
+            </a:r>
+          </a:p>
+          <a:p>
+            <a:endParaRPr lang="es-ES" dirty="0"/>
+          </a:p>
+        </p:txBody>
+      </p:sp>
+      <p:sp>
+        <p:nvSpPr>
+          <p:cNvPr id="5" name="CuadroTexto 4">
+            <a:extLst>
+              <a:ext uri="{FF2B5EF4-FFF2-40B4-BE49-F238E27FC236}">
+                <a16:creationId xmlns:a16="http://schemas.microsoft.com/office/drawing/2014/main" id="{894CB7B9-7B59-427B-AFE3-5563F79462AF}"/>
+              </a:ext>
+            </a:extLst>
+          </p:cNvPr>
+          <p:cNvSpPr txBox="1"/>
+          <p:nvPr/>
+        </p:nvSpPr>
+        <p:spPr>
+          <a:xfrm>
+            <a:off x="2751590" y="4437776"/>
+            <a:ext cx="7734650" cy="1754326"/>
+          </a:xfrm>
+          <a:prstGeom prst="rect">
+            <a:avLst/>
+          </a:prstGeom>
+          <a:noFill/>
+        </p:spPr>
+        <p:txBody>
+          <a:bodyPr wrap="square" rtlCol="0">
+            <a:spAutoFit/>
+          </a:bodyPr>
+          <a:lstStyle/>
+          <a:p>
+            <a:r>
+              <a:rPr lang="es-ES" b="0" i="0" dirty="0">
+                <a:solidFill>
+                  <a:schemeClr val="tx1">
+                    <a:lumMod val="95000"/>
+                  </a:schemeClr>
+                </a:solidFill>
+                <a:effectLst/>
+                <a:latin typeface="Lato" panose="020F0502020204030203" pitchFamily="34" charset="0"/>
+              </a:rPr>
+              <a:t>Detectar antes los errores. Aquí las metodologías ágiles, las entregas iterativas, o las estrategias de Shift </a:t>
+            </a:r>
+            <a:r>
+              <a:rPr lang="es-ES" b="0" i="0" dirty="0" err="1">
+                <a:solidFill>
+                  <a:schemeClr val="tx1">
+                    <a:lumMod val="95000"/>
+                  </a:schemeClr>
+                </a:solidFill>
+                <a:effectLst/>
+                <a:latin typeface="Lato" panose="020F0502020204030203" pitchFamily="34" charset="0"/>
+              </a:rPr>
+              <a:t>Left</a:t>
+            </a:r>
+            <a:r>
+              <a:rPr lang="es-ES" b="0" i="0" dirty="0">
+                <a:solidFill>
+                  <a:schemeClr val="tx1">
+                    <a:lumMod val="95000"/>
+                  </a:schemeClr>
+                </a:solidFill>
+                <a:effectLst/>
+                <a:latin typeface="Lato" panose="020F0502020204030203" pitchFamily="34" charset="0"/>
+              </a:rPr>
+              <a:t>, pueden ser de utilidad. Esta es la tendencia actual. Es decir, asumimos que se cometerán errores en las primeras fases, pero en vez de invertir en evitarlos, invertimos en detectarlos lo antes posible.</a:t>
+            </a:r>
+          </a:p>
+          <a:p>
+            <a:endParaRPr lang="es-ES" dirty="0"/>
+          </a:p>
+        </p:txBody>
+      </p:sp>
+    </p:spTree>
+    <p:extLst>
+      <p:ext uri="{BB962C8B-B14F-4D97-AF65-F5344CB8AC3E}">
+        <p14:creationId xmlns:p14="http://schemas.microsoft.com/office/powerpoint/2010/main" val="3835857419"/>
+      </p:ext>
+    </p:extLst>
+  </p:cSld>
+  <p:clrMapOvr>
+    <a:masterClrMapping/>
+  </p:clrMapOvr>
+</p:sld>
+</file>
+
 <file path=ppt/theme/theme1.xml><?xml version="1.0" encoding="utf-8"?>
 <a:theme xmlns:a="http://schemas.openxmlformats.org/drawingml/2006/main" name="LeafVTI">
   <a:themeElements>

</xml_diff>